<commit_message>
Updated presentation for this year
</commit_message>
<xml_diff>
--- a/TimeManagementAndProjectPlanning.pptx
+++ b/TimeManagementAndProjectPlanning.pptx
@@ -26,11 +26,11 @@
     <p:sldId id="275" r:id="rId14"/>
     <p:sldId id="276" r:id="rId15"/>
     <p:sldId id="277" r:id="rId16"/>
-    <p:sldId id="278" r:id="rId17"/>
-    <p:sldId id="264" r:id="rId18"/>
-    <p:sldId id="263" r:id="rId19"/>
-    <p:sldId id="268" r:id="rId20"/>
-    <p:sldId id="262" r:id="rId21"/>
+    <p:sldId id="264" r:id="rId17"/>
+    <p:sldId id="263" r:id="rId18"/>
+    <p:sldId id="268" r:id="rId19"/>
+    <p:sldId id="262" r:id="rId20"/>
+    <p:sldId id="278" r:id="rId21"/>
   </p:sldIdLst>
   <p:sldSz cx="9144000" cy="6858000" type="screen4x3"/>
   <p:notesSz cx="6735763" cy="9866313"/>
@@ -4551,7 +4551,11 @@
             <a:pPr algn="r"/>
             <a:r>
               <a:rPr lang="en-AU" sz="2000" dirty="0" smtClean="0"/>
-              <a:t>Lead Consultant, Readify</a:t>
+              <a:t>Principal Consultant</a:t>
+            </a:r>
+            <a:r>
+              <a:rPr lang="en-AU" sz="2000" dirty="0" smtClean="0"/>
+              <a:t>, Readify</a:t>
             </a:r>
           </a:p>
           <a:p>
@@ -4713,13 +4717,8 @@
           <a:p>
             <a:r>
               <a:rPr lang="en-AU" dirty="0" smtClean="0"/>
-              <a:t>Each day review the activities you planned to refresh your </a:t>
-            </a:r>
-            <a:r>
-              <a:rPr lang="en-AU" dirty="0" smtClean="0"/>
-              <a:t>memory</a:t>
-            </a:r>
-            <a:endParaRPr lang="en-AU" dirty="0" smtClean="0"/>
+              <a:t>Each day review the activities you planned to refresh your memory</a:t>
+            </a:r>
           </a:p>
         </p:txBody>
       </p:sp>
@@ -4847,11 +4846,7 @@
             </a:r>
             <a:r>
               <a:rPr lang="en-AU" dirty="0" smtClean="0"/>
-              <a:t>actual </a:t>
-            </a:r>
-            <a:r>
-              <a:rPr lang="en-AU" dirty="0" smtClean="0"/>
-              <a:t>work</a:t>
+              <a:t>actual work</a:t>
             </a:r>
           </a:p>
           <a:p>
@@ -4865,15 +4860,7 @@
             <a:pPr lvl="1"/>
             <a:r>
               <a:rPr lang="en-AU" dirty="0" smtClean="0"/>
-              <a:t>Consider </a:t>
-            </a:r>
-            <a:r>
-              <a:rPr lang="en-AU" dirty="0" smtClean="0"/>
-              <a:t>what new things you have </a:t>
-            </a:r>
-            <a:r>
-              <a:rPr lang="en-AU" dirty="0" smtClean="0"/>
-              <a:t>learnt</a:t>
+              <a:t>Consider what new things you have learnt</a:t>
             </a:r>
           </a:p>
           <a:p>
@@ -5767,70 +5754,11 @@
           <a:p>
             <a:r>
               <a:rPr lang="en-AU" dirty="0" smtClean="0"/>
-              <a:t>Thankyou</a:t>
-            </a:r>
-            <a:br>
+              <a:t>Useful </a:t>
+            </a:r>
+            <a:r>
               <a:rPr lang="en-AU" dirty="0" smtClean="0"/>
-            </a:br>
-            <a:r>
-              <a:rPr lang="en-AU" dirty="0"/>
-              <a:t/>
-            </a:r>
-            <a:br>
-              <a:rPr lang="en-AU" dirty="0"/>
-            </a:br>
-            <a:r>
-              <a:rPr lang="en-AU" sz="2400" dirty="0" smtClean="0"/>
-              <a:t>See slides for bonus content</a:t>
-            </a:r>
-            <a:endParaRPr lang="en-AU" dirty="0"/>
-          </a:p>
-        </p:txBody>
-      </p:sp>
-      <p:sp>
-        <p:nvSpPr>
-          <p:cNvPr id="3" name="Text Placeholder 2"/>
-          <p:cNvSpPr>
-            <a:spLocks noGrp="1"/>
-          </p:cNvSpPr>
-          <p:nvPr>
-            <p:ph type="body" idx="1"/>
-          </p:nvPr>
-        </p:nvSpPr>
-        <p:spPr/>
-        <p:txBody>
-          <a:bodyPr/>
-          <a:lstStyle/>
-          <a:p>
-            <a:pPr algn="r"/>
-            <a:r>
-              <a:rPr lang="en-AU" dirty="0" smtClean="0"/>
-              <a:t>Rob Moore</a:t>
-            </a:r>
-          </a:p>
-          <a:p>
-            <a:pPr algn="r"/>
-            <a:r>
-              <a:rPr lang="en-AU" dirty="0" smtClean="0"/>
-              <a:t>Lead Consultant, Readify</a:t>
-            </a:r>
-          </a:p>
-          <a:p>
-            <a:pPr algn="r"/>
-            <a:r>
-              <a:rPr lang="en-AU" dirty="0" smtClean="0"/>
-              <a:t>rob.moore@readify.net</a:t>
-            </a:r>
-          </a:p>
-          <a:p>
-            <a:pPr algn="r"/>
-            <a:r>
-              <a:rPr lang="en-AU" dirty="0" smtClean="0"/>
-              <a:t>@</a:t>
-            </a:r>
-            <a:r>
-              <a:rPr lang="en-AU" dirty="0" err="1" smtClean="0"/>
-              <a:t>robdmoore</a:t>
+              <a:t>tips/techniques</a:t>
             </a:r>
             <a:endParaRPr lang="en-AU" dirty="0"/>
           </a:p>
@@ -5868,7 +5796,7 @@
     </p:spTree>
     <p:extLst>
       <p:ext uri="{BB962C8B-B14F-4D97-AF65-F5344CB8AC3E}">
-        <p14:creationId xmlns:p14="http://schemas.microsoft.com/office/powerpoint/2010/main" val="3789521454"/>
+        <p14:creationId xmlns:p14="http://schemas.microsoft.com/office/powerpoint/2010/main" val="579918609"/>
       </p:ext>
     </p:extLst>
   </p:cSld>
@@ -5919,11 +5847,67 @@
           <a:p>
             <a:r>
               <a:rPr lang="en-AU" dirty="0" smtClean="0"/>
-              <a:t>Useful </a:t>
-            </a:r>
+              <a:t>Sustainable pace</a:t>
+            </a:r>
+            <a:endParaRPr lang="en-AU" dirty="0"/>
+          </a:p>
+        </p:txBody>
+      </p:sp>
+      <p:sp>
+        <p:nvSpPr>
+          <p:cNvPr id="3" name="Content Placeholder 2"/>
+          <p:cNvSpPr>
+            <a:spLocks noGrp="1"/>
+          </p:cNvSpPr>
+          <p:nvPr>
+            <p:ph idx="1"/>
+          </p:nvPr>
+        </p:nvSpPr>
+        <p:spPr/>
+        <p:txBody>
+          <a:bodyPr/>
+          <a:lstStyle/>
+          <a:p>
             <a:r>
               <a:rPr lang="en-AU" dirty="0" smtClean="0"/>
-              <a:t>techniques (bonus content)</a:t>
+              <a:t>Consistently sacrificing sleep and weekends </a:t>
+            </a:r>
+            <a:r>
+              <a:rPr lang="en-AU" sz="4400" dirty="0" smtClean="0"/>
+              <a:t>isn’t sustainable</a:t>
+            </a:r>
+            <a:endParaRPr lang="en-AU" dirty="0" smtClean="0"/>
+          </a:p>
+          <a:p>
+            <a:r>
+              <a:rPr lang="en-AU" dirty="0" smtClean="0"/>
+              <a:t>The quality and efficiency of your work drops and you </a:t>
+            </a:r>
+            <a:r>
+              <a:rPr lang="en-AU" sz="4400" dirty="0" smtClean="0"/>
+              <a:t>get less done</a:t>
+            </a:r>
+            <a:endParaRPr lang="en-AU" dirty="0" smtClean="0"/>
+          </a:p>
+          <a:p>
+            <a:endParaRPr lang="en-AU" dirty="0" smtClean="0"/>
+          </a:p>
+          <a:p>
+            <a:r>
+              <a:rPr lang="en-AU" dirty="0" smtClean="0"/>
+              <a:t>Get </a:t>
+            </a:r>
+            <a:r>
+              <a:rPr lang="en-AU" b="1" dirty="0" smtClean="0"/>
+              <a:t>help</a:t>
+            </a:r>
+            <a:r>
+              <a:rPr lang="en-AU" sz="1800" dirty="0" smtClean="0"/>
+              <a:t> </a:t>
+            </a:r>
+            <a:r>
+              <a:rPr lang="en-AU" dirty="0" smtClean="0"/>
+              <a:t>if you need an unsustainable pace to get everything done!</a:t>
             </a:r>
             <a:endParaRPr lang="en-AU" dirty="0"/>
           </a:p>
@@ -5961,20 +5945,13 @@
     </p:spTree>
     <p:extLst>
       <p:ext uri="{BB962C8B-B14F-4D97-AF65-F5344CB8AC3E}">
-        <p14:creationId xmlns:p14="http://schemas.microsoft.com/office/powerpoint/2010/main" val="579918609"/>
+        <p14:creationId xmlns:p14="http://schemas.microsoft.com/office/powerpoint/2010/main" val="2636639351"/>
       </p:ext>
     </p:extLst>
   </p:cSld>
   <p:clrMapOvr>
     <a:masterClrMapping/>
   </p:clrMapOvr>
-  <p:timing>
-    <p:tnLst>
-      <p:par>
-        <p:cTn id="1" dur="indefinite" restart="never" nodeType="tmRoot"/>
-      </p:par>
-    </p:tnLst>
-  </p:timing>
 </p:sld>
 </file>
 
@@ -6012,7 +5989,7 @@
           <a:p>
             <a:r>
               <a:rPr lang="en-AU" dirty="0" smtClean="0"/>
-              <a:t>Sustainable pace</a:t>
+              <a:t>Task visualisation</a:t>
             </a:r>
             <a:endParaRPr lang="en-AU" dirty="0"/>
           </a:p>
@@ -6035,46 +6012,48 @@
           <a:p>
             <a:r>
               <a:rPr lang="en-AU" dirty="0" smtClean="0"/>
-              <a:t>Consistently sacrificing sleep and weekends </a:t>
-            </a:r>
-            <a:r>
-              <a:rPr lang="en-AU" sz="4400" dirty="0" smtClean="0"/>
-              <a:t>isn’t sustainable</a:t>
+              <a:t>Visualising your prioritised </a:t>
+            </a:r>
+            <a:r>
+              <a:rPr lang="en-AU" dirty="0" err="1" smtClean="0"/>
+              <a:t>todo</a:t>
+            </a:r>
+            <a:r>
+              <a:rPr lang="en-AU" dirty="0" smtClean="0"/>
+              <a:t> list helps you </a:t>
+            </a:r>
+            <a:r>
+              <a:rPr lang="en-AU" sz="4800" dirty="0" smtClean="0"/>
+              <a:t>focus</a:t>
             </a:r>
             <a:endParaRPr lang="en-AU" dirty="0" smtClean="0"/>
           </a:p>
           <a:p>
             <a:r>
               <a:rPr lang="en-AU" dirty="0" smtClean="0"/>
-              <a:t>The quality and efficiency of your work drops and you </a:t>
-            </a:r>
-            <a:r>
-              <a:rPr lang="en-AU" sz="4400" dirty="0" smtClean="0"/>
-              <a:t>get less done</a:t>
-            </a:r>
+              <a:t>It makes you more </a:t>
+            </a:r>
+            <a:r>
+              <a:rPr lang="en-AU" sz="4800" dirty="0" smtClean="0"/>
+              <a:t>efficient</a:t>
+            </a:r>
+            <a:r>
+              <a:rPr lang="en-AU" dirty="0" smtClean="0"/>
+              <a:t> and helps stop context switching</a:t>
+            </a:r>
+          </a:p>
+          <a:p>
             <a:endParaRPr lang="en-AU" dirty="0" smtClean="0"/>
           </a:p>
           <a:p>
-            <a:endParaRPr lang="en-AU" dirty="0" smtClean="0"/>
-          </a:p>
-          <a:p>
-            <a:r>
-              <a:rPr lang="en-AU" dirty="0" smtClean="0"/>
-              <a:t>Get </a:t>
-            </a:r>
-            <a:r>
-              <a:rPr lang="en-AU" b="1" dirty="0" smtClean="0"/>
-              <a:t>help</a:t>
-            </a:r>
-            <a:r>
-              <a:rPr lang="en-AU" sz="1800" dirty="0" smtClean="0"/>
-              <a:t> </a:t>
-            </a:r>
-            <a:r>
-              <a:rPr lang="en-AU" dirty="0" smtClean="0"/>
-              <a:t>if you need an unsustainable pace to get everything done!</a:t>
-            </a:r>
-            <a:endParaRPr lang="en-AU" dirty="0"/>
+            <a:pPr marL="0" indent="0">
+              <a:buNone/>
+            </a:pPr>
+            <a:r>
+              <a:rPr lang="en-AU" sz="2800" dirty="0" smtClean="0"/>
+              <a:t>					trello.com</a:t>
+            </a:r>
+            <a:endParaRPr lang="en-AU" sz="2800" dirty="0"/>
           </a:p>
         </p:txBody>
       </p:sp>
@@ -6102,150 +6081,6 @@
                 <a:defRPr/>
               </a:pPr>
               <a:t>18</a:t>
-            </a:fld>
-            <a:endParaRPr lang="en-GB" dirty="0"/>
-          </a:p>
-        </p:txBody>
-      </p:sp>
-    </p:spTree>
-    <p:extLst>
-      <p:ext uri="{BB962C8B-B14F-4D97-AF65-F5344CB8AC3E}">
-        <p14:creationId xmlns:p14="http://schemas.microsoft.com/office/powerpoint/2010/main" val="2636639351"/>
-      </p:ext>
-    </p:extLst>
-  </p:cSld>
-  <p:clrMapOvr>
-    <a:masterClrMapping/>
-  </p:clrMapOvr>
-</p:sld>
-</file>
-
-<file path=ppt/slides/slide19.xml><?xml version="1.0" encoding="utf-8"?>
-<p:sld xmlns:a="http://schemas.openxmlformats.org/drawingml/2006/main" xmlns:r="http://schemas.openxmlformats.org/officeDocument/2006/relationships" xmlns:p="http://schemas.openxmlformats.org/presentationml/2006/main">
-  <p:cSld>
-    <p:spTree>
-      <p:nvGrpSpPr>
-        <p:cNvPr id="1" name=""/>
-        <p:cNvGrpSpPr/>
-        <p:nvPr/>
-      </p:nvGrpSpPr>
-      <p:grpSpPr>
-        <a:xfrm>
-          <a:off x="0" y="0"/>
-          <a:ext cx="0" cy="0"/>
-          <a:chOff x="0" y="0"/>
-          <a:chExt cx="0" cy="0"/>
-        </a:xfrm>
-      </p:grpSpPr>
-      <p:sp>
-        <p:nvSpPr>
-          <p:cNvPr id="2" name="Title 1"/>
-          <p:cNvSpPr>
-            <a:spLocks noGrp="1"/>
-          </p:cNvSpPr>
-          <p:nvPr>
-            <p:ph type="title"/>
-          </p:nvPr>
-        </p:nvSpPr>
-        <p:spPr/>
-        <p:txBody>
-          <a:bodyPr/>
-          <a:lstStyle/>
-          <a:p>
-            <a:r>
-              <a:rPr lang="en-AU" dirty="0" smtClean="0"/>
-              <a:t>Task visualisation</a:t>
-            </a:r>
-            <a:endParaRPr lang="en-AU" dirty="0"/>
-          </a:p>
-        </p:txBody>
-      </p:sp>
-      <p:sp>
-        <p:nvSpPr>
-          <p:cNvPr id="3" name="Content Placeholder 2"/>
-          <p:cNvSpPr>
-            <a:spLocks noGrp="1"/>
-          </p:cNvSpPr>
-          <p:nvPr>
-            <p:ph idx="1"/>
-          </p:nvPr>
-        </p:nvSpPr>
-        <p:spPr/>
-        <p:txBody>
-          <a:bodyPr/>
-          <a:lstStyle/>
-          <a:p>
-            <a:r>
-              <a:rPr lang="en-AU" dirty="0" smtClean="0"/>
-              <a:t>Visualising your prioritised </a:t>
-            </a:r>
-            <a:r>
-              <a:rPr lang="en-AU" dirty="0" err="1" smtClean="0"/>
-              <a:t>todo</a:t>
-            </a:r>
-            <a:r>
-              <a:rPr lang="en-AU" dirty="0" smtClean="0"/>
-              <a:t> list helps you </a:t>
-            </a:r>
-            <a:r>
-              <a:rPr lang="en-AU" sz="4800" dirty="0" smtClean="0"/>
-              <a:t>focus</a:t>
-            </a:r>
-            <a:endParaRPr lang="en-AU" dirty="0" smtClean="0"/>
-          </a:p>
-          <a:p>
-            <a:r>
-              <a:rPr lang="en-AU" dirty="0" smtClean="0"/>
-              <a:t>It makes you more </a:t>
-            </a:r>
-            <a:r>
-              <a:rPr lang="en-AU" sz="4800" dirty="0" smtClean="0"/>
-              <a:t>efficient</a:t>
-            </a:r>
-            <a:r>
-              <a:rPr lang="en-AU" dirty="0" smtClean="0"/>
-              <a:t> and helps stop context switching</a:t>
-            </a:r>
-          </a:p>
-          <a:p>
-            <a:endParaRPr lang="en-AU" dirty="0" smtClean="0"/>
-          </a:p>
-          <a:p>
-            <a:pPr marL="0" indent="0">
-              <a:buNone/>
-            </a:pPr>
-            <a:r>
-              <a:rPr lang="en-AU" sz="2800" dirty="0" smtClean="0"/>
-              <a:t>					trello.com</a:t>
-            </a:r>
-            <a:endParaRPr lang="en-AU" sz="2800" dirty="0"/>
-          </a:p>
-        </p:txBody>
-      </p:sp>
-      <p:sp>
-        <p:nvSpPr>
-          <p:cNvPr id="4" name="Slide Number Placeholder 3"/>
-          <p:cNvSpPr>
-            <a:spLocks noGrp="1"/>
-          </p:cNvSpPr>
-          <p:nvPr>
-            <p:ph type="sldNum" sz="quarter" idx="4"/>
-          </p:nvPr>
-        </p:nvSpPr>
-        <p:spPr/>
-        <p:txBody>
-          <a:bodyPr/>
-          <a:lstStyle/>
-          <a:p>
-            <a:pPr>
-              <a:defRPr/>
-            </a:pPr>
-            <a:fld id="{92185B65-240A-465E-998D-9B43C073AEB9}" type="slidenum">
-              <a:rPr lang="en-GB" smtClean="0"/>
-              <a:pPr>
-                <a:defRPr/>
-              </a:pPr>
-              <a:t>19</a:t>
             </a:fld>
             <a:endParaRPr lang="en-GB" dirty="0"/>
           </a:p>
@@ -6305,7 +6140,7 @@
 </p:sld>
 </file>
 
-<file path=ppt/slides/slide2.xml><?xml version="1.0" encoding="utf-8"?>
+<file path=ppt/slides/slide19.xml><?xml version="1.0" encoding="utf-8"?>
 <p:sld xmlns:a="http://schemas.openxmlformats.org/drawingml/2006/main" xmlns:r="http://schemas.openxmlformats.org/officeDocument/2006/relationships" xmlns:p="http://schemas.openxmlformats.org/presentationml/2006/main">
   <p:cSld>
     <p:spTree>
@@ -6338,10 +6173,18 @@
           <a:lstStyle/>
           <a:p>
             <a:r>
-              <a:rPr lang="en-GB" dirty="0" smtClean="0"/>
-              <a:t>Why is it important?</a:t>
-            </a:r>
-            <a:endParaRPr lang="en-GB" dirty="0"/>
+              <a:rPr lang="en-AU" dirty="0" err="1" smtClean="0"/>
+              <a:t>Pomodoro</a:t>
+            </a:r>
+            <a:r>
+              <a:rPr lang="en-AU" dirty="0" smtClean="0"/>
+              <a:t> / </a:t>
+            </a:r>
+            <a:r>
+              <a:rPr lang="en-AU" dirty="0" err="1" smtClean="0"/>
+              <a:t>Timeboxing</a:t>
+            </a:r>
+            <a:endParaRPr lang="en-AU" dirty="0"/>
           </a:p>
         </p:txBody>
       </p:sp>
@@ -6355,107 +6198,60 @@
             <p:ph idx="1"/>
           </p:nvPr>
         </p:nvSpPr>
-        <p:spPr>
-          <a:xfrm>
-            <a:off x="457200" y="1340768"/>
-            <a:ext cx="8229600" cy="3810000"/>
-          </a:xfrm>
-        </p:spPr>
+        <p:spPr/>
         <p:txBody>
           <a:bodyPr/>
           <a:lstStyle/>
           <a:p>
             <a:r>
-              <a:rPr lang="en-GB" sz="2800" dirty="0" smtClean="0"/>
-              <a:t>Do you ever feel </a:t>
-            </a:r>
-            <a:r>
-              <a:rPr lang="en-GB" sz="4400" dirty="0" smtClean="0"/>
-              <a:t>overwhelmed</a:t>
-            </a:r>
-            <a:r>
-              <a:rPr lang="en-GB" sz="2800" dirty="0" smtClean="0"/>
-              <a:t> with:</a:t>
-            </a:r>
-          </a:p>
-          <a:p>
-            <a:pPr lvl="1"/>
-            <a:r>
-              <a:rPr lang="en-GB" sz="2400" dirty="0" err="1" smtClean="0"/>
-              <a:t>Uni</a:t>
-            </a:r>
-            <a:r>
-              <a:rPr lang="en-GB" sz="2400" dirty="0" smtClean="0"/>
-              <a:t> classes</a:t>
-            </a:r>
-          </a:p>
-          <a:p>
-            <a:pPr lvl="1"/>
-            <a:r>
-              <a:rPr lang="en-GB" sz="2400" dirty="0" err="1" smtClean="0"/>
-              <a:t>Uni</a:t>
-            </a:r>
-            <a:r>
-              <a:rPr lang="en-GB" sz="2400" dirty="0" smtClean="0"/>
-              <a:t> assignments and tests</a:t>
-            </a:r>
-          </a:p>
-          <a:p>
-            <a:pPr lvl="1"/>
-            <a:r>
-              <a:rPr lang="en-GB" sz="2400" dirty="0" smtClean="0"/>
-              <a:t>Work (multiple jobs?)</a:t>
-            </a:r>
-          </a:p>
-          <a:p>
-            <a:pPr lvl="1"/>
-            <a:r>
-              <a:rPr lang="en-GB" sz="2400" b="1" dirty="0" smtClean="0"/>
-              <a:t>Extracurricular activities</a:t>
-            </a:r>
-          </a:p>
-          <a:p>
-            <a:pPr lvl="1"/>
-            <a:r>
-              <a:rPr lang="en-GB" sz="2400" dirty="0" smtClean="0"/>
-              <a:t>Maintaining relationships (friends, family, lovers)</a:t>
-            </a:r>
-          </a:p>
-          <a:p>
-            <a:pPr lvl="1"/>
-            <a:r>
-              <a:rPr lang="en-GB" sz="2400" dirty="0" smtClean="0"/>
-              <a:t>Housework</a:t>
-            </a:r>
-          </a:p>
-          <a:p>
-            <a:pPr lvl="1"/>
-            <a:r>
-              <a:rPr lang="en-GB" sz="2400" dirty="0" smtClean="0"/>
-              <a:t>Leisure, quiet time, exercising, reading, etc.)</a:t>
-            </a:r>
-          </a:p>
-          <a:p>
-            <a:r>
-              <a:rPr lang="en-GB" sz="2800" dirty="0" smtClean="0"/>
-              <a:t>Do you have </a:t>
-            </a:r>
-            <a:r>
-              <a:rPr lang="en-GB" sz="2800" i="1" dirty="0" smtClean="0"/>
-              <a:t>competing</a:t>
-            </a:r>
-            <a:r>
-              <a:rPr lang="en-GB" sz="2800" dirty="0" smtClean="0"/>
-              <a:t> </a:t>
-            </a:r>
-            <a:r>
-              <a:rPr lang="en-GB" sz="4400" dirty="0" smtClean="0"/>
-              <a:t>deadlines</a:t>
-            </a:r>
-            <a:r>
-              <a:rPr lang="en-GB" sz="2800" dirty="0" smtClean="0"/>
-              <a:t>?</a:t>
-            </a:r>
+              <a:rPr lang="en-AU" dirty="0" smtClean="0"/>
+              <a:t>Procrastination is damaging to efficiency</a:t>
+            </a:r>
+          </a:p>
+          <a:p>
+            <a:r>
+              <a:rPr lang="en-AU" dirty="0" smtClean="0"/>
+              <a:t>Ensure focus by setting aside a specific amount of time</a:t>
+            </a:r>
+          </a:p>
+          <a:p>
+            <a:r>
+              <a:rPr lang="en-AU" dirty="0" smtClean="0"/>
+              <a:t>Take a small break after that time and reflect on what you did</a:t>
+            </a:r>
+          </a:p>
+          <a:p>
+            <a:endParaRPr lang="en-AU" dirty="0" smtClean="0"/>
+          </a:p>
+          <a:p>
+            <a:pPr marL="0" indent="0">
+              <a:buNone/>
+            </a:pPr>
+            <a:r>
+              <a:rPr lang="en-AU" sz="2800" dirty="0" smtClean="0"/>
+              <a:t>				pomodorotechnique.com</a:t>
+            </a:r>
+          </a:p>
+          <a:p>
+            <a:pPr marL="0" indent="0">
+              <a:buNone/>
+            </a:pPr>
+            <a:r>
+              <a:rPr lang="en-AU" sz="2800" dirty="0" smtClean="0"/>
+              <a:t>			</a:t>
+            </a:r>
+            <a:r>
+              <a:rPr lang="en-AU" sz="2400" dirty="0" smtClean="0"/>
+              <a:t>	workawesome.com/productivity/</a:t>
+            </a:r>
+            <a:r>
+              <a:rPr lang="en-AU" sz="2400" dirty="0" err="1" smtClean="0"/>
+              <a:t>timeboxing</a:t>
+            </a:r>
+            <a:endParaRPr lang="en-AU" dirty="0" smtClean="0"/>
+          </a:p>
+          <a:p>
+            <a:endParaRPr lang="en-AU" dirty="0"/>
           </a:p>
         </p:txBody>
       </p:sp>
@@ -6482,171 +6278,7 @@
               <a:pPr>
                 <a:defRPr/>
               </a:pPr>
-              <a:t>2</a:t>
-            </a:fld>
-            <a:endParaRPr lang="en-GB" dirty="0"/>
-          </a:p>
-        </p:txBody>
-      </p:sp>
-    </p:spTree>
-    <p:extLst>
-      <p:ext uri="{BB962C8B-B14F-4D97-AF65-F5344CB8AC3E}">
-        <p14:creationId xmlns:p14="http://schemas.microsoft.com/office/powerpoint/2010/main" val="1137752938"/>
-      </p:ext>
-    </p:extLst>
-  </p:cSld>
-  <p:clrMapOvr>
-    <a:masterClrMapping/>
-  </p:clrMapOvr>
-  <p:timing>
-    <p:tnLst>
-      <p:par>
-        <p:cTn id="1" dur="indefinite" restart="never" nodeType="tmRoot"/>
-      </p:par>
-    </p:tnLst>
-  </p:timing>
-</p:sld>
-</file>
-
-<file path=ppt/slides/slide20.xml><?xml version="1.0" encoding="utf-8"?>
-<p:sld xmlns:a="http://schemas.openxmlformats.org/drawingml/2006/main" xmlns:r="http://schemas.openxmlformats.org/officeDocument/2006/relationships" xmlns:p="http://schemas.openxmlformats.org/presentationml/2006/main">
-  <p:cSld>
-    <p:spTree>
-      <p:nvGrpSpPr>
-        <p:cNvPr id="1" name=""/>
-        <p:cNvGrpSpPr/>
-        <p:nvPr/>
-      </p:nvGrpSpPr>
-      <p:grpSpPr>
-        <a:xfrm>
-          <a:off x="0" y="0"/>
-          <a:ext cx="0" cy="0"/>
-          <a:chOff x="0" y="0"/>
-          <a:chExt cx="0" cy="0"/>
-        </a:xfrm>
-      </p:grpSpPr>
-      <p:sp>
-        <p:nvSpPr>
-          <p:cNvPr id="2" name="Title 1"/>
-          <p:cNvSpPr>
-            <a:spLocks noGrp="1"/>
-          </p:cNvSpPr>
-          <p:nvPr>
-            <p:ph type="title"/>
-          </p:nvPr>
-        </p:nvSpPr>
-        <p:spPr/>
-        <p:txBody>
-          <a:bodyPr/>
-          <a:lstStyle/>
-          <a:p>
-            <a:r>
-              <a:rPr lang="en-AU" dirty="0" err="1" smtClean="0"/>
-              <a:t>Pomodoro</a:t>
-            </a:r>
-            <a:r>
-              <a:rPr lang="en-AU" dirty="0" smtClean="0"/>
-              <a:t> / </a:t>
-            </a:r>
-            <a:r>
-              <a:rPr lang="en-AU" dirty="0" err="1" smtClean="0"/>
-              <a:t>Timeboxing</a:t>
-            </a:r>
-            <a:endParaRPr lang="en-AU" dirty="0"/>
-          </a:p>
-        </p:txBody>
-      </p:sp>
-      <p:sp>
-        <p:nvSpPr>
-          <p:cNvPr id="3" name="Content Placeholder 2"/>
-          <p:cNvSpPr>
-            <a:spLocks noGrp="1"/>
-          </p:cNvSpPr>
-          <p:nvPr>
-            <p:ph idx="1"/>
-          </p:nvPr>
-        </p:nvSpPr>
-        <p:spPr/>
-        <p:txBody>
-          <a:bodyPr/>
-          <a:lstStyle/>
-          <a:p>
-            <a:r>
-              <a:rPr lang="en-AU" dirty="0" smtClean="0"/>
-              <a:t>Procrastination is damaging to efficiency</a:t>
-            </a:r>
-          </a:p>
-          <a:p>
-            <a:r>
-              <a:rPr lang="en-AU" dirty="0" smtClean="0"/>
-              <a:t>Ensure focus by setting aside a specific amount of time</a:t>
-            </a:r>
-          </a:p>
-          <a:p>
-            <a:r>
-              <a:rPr lang="en-AU" dirty="0" smtClean="0"/>
-              <a:t>Take a small break after that time and reflect on what you did</a:t>
-            </a:r>
-          </a:p>
-          <a:p>
-            <a:endParaRPr lang="en-AU" dirty="0" smtClean="0"/>
-          </a:p>
-          <a:p>
-            <a:pPr marL="0" indent="0">
-              <a:buNone/>
-            </a:pPr>
-            <a:r>
-              <a:rPr lang="en-AU" sz="2800" dirty="0" smtClean="0"/>
-              <a:t>				pomodorotechnique.com</a:t>
-            </a:r>
-          </a:p>
-          <a:p>
-            <a:pPr marL="0" indent="0">
-              <a:buNone/>
-            </a:pPr>
-            <a:r>
-              <a:rPr lang="en-AU" sz="2800" dirty="0" smtClean="0"/>
-              <a:t>			</a:t>
-            </a:r>
-            <a:r>
-              <a:rPr lang="en-AU" sz="2400" dirty="0" smtClean="0"/>
-              <a:t>	workawesome.com/productivity/</a:t>
-            </a:r>
-            <a:r>
-              <a:rPr lang="en-AU" sz="2400" dirty="0" err="1" smtClean="0"/>
-              <a:t>timeboxing</a:t>
-            </a:r>
-            <a:endParaRPr lang="en-AU" dirty="0" smtClean="0"/>
-          </a:p>
-          <a:p>
-            <a:endParaRPr lang="en-AU" dirty="0"/>
-          </a:p>
-        </p:txBody>
-      </p:sp>
-      <p:sp>
-        <p:nvSpPr>
-          <p:cNvPr id="4" name="Slide Number Placeholder 3"/>
-          <p:cNvSpPr>
-            <a:spLocks noGrp="1"/>
-          </p:cNvSpPr>
-          <p:nvPr>
-            <p:ph type="sldNum" sz="quarter" idx="4"/>
-          </p:nvPr>
-        </p:nvSpPr>
-        <p:spPr/>
-        <p:txBody>
-          <a:bodyPr/>
-          <a:lstStyle/>
-          <a:p>
-            <a:pPr>
-              <a:defRPr/>
-            </a:pPr>
-            <a:fld id="{92185B65-240A-465E-998D-9B43C073AEB9}" type="slidenum">
-              <a:rPr lang="en-GB" smtClean="0"/>
-              <a:pPr>
-                <a:defRPr/>
-              </a:pPr>
-              <a:t>20</a:t>
+              <a:t>19</a:t>
             </a:fld>
             <a:endParaRPr lang="en-GB" dirty="0"/>
           </a:p>
@@ -6703,6 +6335,351 @@
   <p:clrMapOvr>
     <a:masterClrMapping/>
   </p:clrMapOvr>
+</p:sld>
+</file>
+
+<file path=ppt/slides/slide2.xml><?xml version="1.0" encoding="utf-8"?>
+<p:sld xmlns:a="http://schemas.openxmlformats.org/drawingml/2006/main" xmlns:r="http://schemas.openxmlformats.org/officeDocument/2006/relationships" xmlns:p="http://schemas.openxmlformats.org/presentationml/2006/main">
+  <p:cSld>
+    <p:spTree>
+      <p:nvGrpSpPr>
+        <p:cNvPr id="1" name=""/>
+        <p:cNvGrpSpPr/>
+        <p:nvPr/>
+      </p:nvGrpSpPr>
+      <p:grpSpPr>
+        <a:xfrm>
+          <a:off x="0" y="0"/>
+          <a:ext cx="0" cy="0"/>
+          <a:chOff x="0" y="0"/>
+          <a:chExt cx="0" cy="0"/>
+        </a:xfrm>
+      </p:grpSpPr>
+      <p:sp>
+        <p:nvSpPr>
+          <p:cNvPr id="2" name="Title 1"/>
+          <p:cNvSpPr>
+            <a:spLocks noGrp="1"/>
+          </p:cNvSpPr>
+          <p:nvPr>
+            <p:ph type="title"/>
+          </p:nvPr>
+        </p:nvSpPr>
+        <p:spPr/>
+        <p:txBody>
+          <a:bodyPr/>
+          <a:lstStyle/>
+          <a:p>
+            <a:r>
+              <a:rPr lang="en-GB" dirty="0" smtClean="0"/>
+              <a:t>Why is it important?</a:t>
+            </a:r>
+            <a:endParaRPr lang="en-GB" dirty="0"/>
+          </a:p>
+        </p:txBody>
+      </p:sp>
+      <p:sp>
+        <p:nvSpPr>
+          <p:cNvPr id="3" name="Content Placeholder 2"/>
+          <p:cNvSpPr>
+            <a:spLocks noGrp="1"/>
+          </p:cNvSpPr>
+          <p:nvPr>
+            <p:ph idx="1"/>
+          </p:nvPr>
+        </p:nvSpPr>
+        <p:spPr>
+          <a:xfrm>
+            <a:off x="457200" y="1340768"/>
+            <a:ext cx="8229600" cy="3810000"/>
+          </a:xfrm>
+        </p:spPr>
+        <p:txBody>
+          <a:bodyPr/>
+          <a:lstStyle/>
+          <a:p>
+            <a:r>
+              <a:rPr lang="en-GB" sz="2800" dirty="0" smtClean="0"/>
+              <a:t>Do you ever feel </a:t>
+            </a:r>
+            <a:r>
+              <a:rPr lang="en-GB" sz="4400" dirty="0" smtClean="0"/>
+              <a:t>overwhelmed</a:t>
+            </a:r>
+            <a:r>
+              <a:rPr lang="en-GB" sz="2800" dirty="0" smtClean="0"/>
+              <a:t> with:</a:t>
+            </a:r>
+          </a:p>
+          <a:p>
+            <a:pPr lvl="1"/>
+            <a:r>
+              <a:rPr lang="en-GB" sz="2400" dirty="0" err="1" smtClean="0"/>
+              <a:t>Uni</a:t>
+            </a:r>
+            <a:r>
+              <a:rPr lang="en-GB" sz="2400" dirty="0" smtClean="0"/>
+              <a:t> classes</a:t>
+            </a:r>
+          </a:p>
+          <a:p>
+            <a:pPr lvl="1"/>
+            <a:r>
+              <a:rPr lang="en-GB" sz="2400" dirty="0" err="1" smtClean="0"/>
+              <a:t>Uni</a:t>
+            </a:r>
+            <a:r>
+              <a:rPr lang="en-GB" sz="2400" dirty="0" smtClean="0"/>
+              <a:t> assignments and tests</a:t>
+            </a:r>
+          </a:p>
+          <a:p>
+            <a:pPr lvl="1"/>
+            <a:r>
+              <a:rPr lang="en-GB" sz="2400" dirty="0" smtClean="0"/>
+              <a:t>Work (multiple jobs?)</a:t>
+            </a:r>
+          </a:p>
+          <a:p>
+            <a:pPr lvl="1"/>
+            <a:r>
+              <a:rPr lang="en-GB" sz="2400" b="1" dirty="0" smtClean="0"/>
+              <a:t>Extracurricular activities</a:t>
+            </a:r>
+          </a:p>
+          <a:p>
+            <a:pPr lvl="1"/>
+            <a:r>
+              <a:rPr lang="en-GB" sz="2400" dirty="0" smtClean="0"/>
+              <a:t>Maintaining relationships (friends, family, lovers)</a:t>
+            </a:r>
+          </a:p>
+          <a:p>
+            <a:pPr lvl="1"/>
+            <a:r>
+              <a:rPr lang="en-GB" sz="2400" dirty="0" smtClean="0"/>
+              <a:t>Housework</a:t>
+            </a:r>
+          </a:p>
+          <a:p>
+            <a:pPr lvl="1"/>
+            <a:r>
+              <a:rPr lang="en-GB" sz="2400" dirty="0" smtClean="0"/>
+              <a:t>Leisure, quiet time, exercising, reading, etc.)</a:t>
+            </a:r>
+          </a:p>
+          <a:p>
+            <a:r>
+              <a:rPr lang="en-GB" sz="2800" dirty="0" smtClean="0"/>
+              <a:t>Do you have </a:t>
+            </a:r>
+            <a:r>
+              <a:rPr lang="en-GB" sz="2800" i="1" dirty="0" smtClean="0"/>
+              <a:t>competing</a:t>
+            </a:r>
+            <a:r>
+              <a:rPr lang="en-GB" sz="2800" dirty="0" smtClean="0"/>
+              <a:t> </a:t>
+            </a:r>
+            <a:r>
+              <a:rPr lang="en-GB" sz="4400" dirty="0" smtClean="0"/>
+              <a:t>deadlines</a:t>
+            </a:r>
+            <a:r>
+              <a:rPr lang="en-GB" sz="2800" dirty="0" smtClean="0"/>
+              <a:t>?</a:t>
+            </a:r>
+          </a:p>
+        </p:txBody>
+      </p:sp>
+      <p:sp>
+        <p:nvSpPr>
+          <p:cNvPr id="4" name="Slide Number Placeholder 3"/>
+          <p:cNvSpPr>
+            <a:spLocks noGrp="1"/>
+          </p:cNvSpPr>
+          <p:nvPr>
+            <p:ph type="sldNum" sz="quarter" idx="4"/>
+          </p:nvPr>
+        </p:nvSpPr>
+        <p:spPr/>
+        <p:txBody>
+          <a:bodyPr/>
+          <a:lstStyle/>
+          <a:p>
+            <a:pPr>
+              <a:defRPr/>
+            </a:pPr>
+            <a:fld id="{92185B65-240A-465E-998D-9B43C073AEB9}" type="slidenum">
+              <a:rPr lang="en-GB" smtClean="0"/>
+              <a:pPr>
+                <a:defRPr/>
+              </a:pPr>
+              <a:t>2</a:t>
+            </a:fld>
+            <a:endParaRPr lang="en-GB" dirty="0"/>
+          </a:p>
+        </p:txBody>
+      </p:sp>
+    </p:spTree>
+    <p:extLst>
+      <p:ext uri="{BB962C8B-B14F-4D97-AF65-F5344CB8AC3E}">
+        <p14:creationId xmlns:p14="http://schemas.microsoft.com/office/powerpoint/2010/main" val="1137752938"/>
+      </p:ext>
+    </p:extLst>
+  </p:cSld>
+  <p:clrMapOvr>
+    <a:masterClrMapping/>
+  </p:clrMapOvr>
+  <p:timing>
+    <p:tnLst>
+      <p:par>
+        <p:cTn id="1" dur="indefinite" restart="never" nodeType="tmRoot"/>
+      </p:par>
+    </p:tnLst>
+  </p:timing>
+</p:sld>
+</file>
+
+<file path=ppt/slides/slide20.xml><?xml version="1.0" encoding="utf-8"?>
+<p:sld xmlns:a="http://schemas.openxmlformats.org/drawingml/2006/main" xmlns:r="http://schemas.openxmlformats.org/officeDocument/2006/relationships" xmlns:p="http://schemas.openxmlformats.org/presentationml/2006/main">
+  <p:cSld>
+    <p:spTree>
+      <p:nvGrpSpPr>
+        <p:cNvPr id="1" name=""/>
+        <p:cNvGrpSpPr/>
+        <p:nvPr/>
+      </p:nvGrpSpPr>
+      <p:grpSpPr>
+        <a:xfrm>
+          <a:off x="0" y="0"/>
+          <a:ext cx="0" cy="0"/>
+          <a:chOff x="0" y="0"/>
+          <a:chExt cx="0" cy="0"/>
+        </a:xfrm>
+      </p:grpSpPr>
+      <p:sp>
+        <p:nvSpPr>
+          <p:cNvPr id="2" name="Title 1"/>
+          <p:cNvSpPr>
+            <a:spLocks noGrp="1"/>
+          </p:cNvSpPr>
+          <p:nvPr>
+            <p:ph type="title"/>
+          </p:nvPr>
+        </p:nvSpPr>
+        <p:spPr/>
+        <p:txBody>
+          <a:bodyPr/>
+          <a:lstStyle/>
+          <a:p>
+            <a:r>
+              <a:rPr lang="en-AU" dirty="0" smtClean="0"/>
+              <a:t>Thankyou</a:t>
+            </a:r>
+            <a:endParaRPr lang="en-AU" dirty="0"/>
+          </a:p>
+        </p:txBody>
+      </p:sp>
+      <p:sp>
+        <p:nvSpPr>
+          <p:cNvPr id="3" name="Text Placeholder 2"/>
+          <p:cNvSpPr>
+            <a:spLocks noGrp="1"/>
+          </p:cNvSpPr>
+          <p:nvPr>
+            <p:ph type="body" idx="1"/>
+          </p:nvPr>
+        </p:nvSpPr>
+        <p:spPr/>
+        <p:txBody>
+          <a:bodyPr/>
+          <a:lstStyle/>
+          <a:p>
+            <a:pPr algn="r"/>
+            <a:r>
+              <a:rPr lang="en-AU" dirty="0" smtClean="0"/>
+              <a:t>Rob Moore</a:t>
+            </a:r>
+          </a:p>
+          <a:p>
+            <a:pPr algn="r"/>
+            <a:r>
+              <a:rPr lang="en-AU" dirty="0" smtClean="0"/>
+              <a:t>Principal Consultant</a:t>
+            </a:r>
+            <a:r>
+              <a:rPr lang="en-AU" dirty="0" smtClean="0"/>
+              <a:t>, Readify</a:t>
+            </a:r>
+          </a:p>
+          <a:p>
+            <a:pPr algn="r"/>
+            <a:r>
+              <a:rPr lang="en-AU" dirty="0" smtClean="0"/>
+              <a:t>rob.moore@readify.net</a:t>
+            </a:r>
+          </a:p>
+          <a:p>
+            <a:pPr algn="r"/>
+            <a:r>
+              <a:rPr lang="en-AU" dirty="0" smtClean="0"/>
+              <a:t>@</a:t>
+            </a:r>
+            <a:r>
+              <a:rPr lang="en-AU" dirty="0" err="1" smtClean="0"/>
+              <a:t>robdmoore</a:t>
+            </a:r>
+            <a:endParaRPr lang="en-AU" dirty="0"/>
+          </a:p>
+        </p:txBody>
+      </p:sp>
+      <p:sp>
+        <p:nvSpPr>
+          <p:cNvPr id="4" name="Slide Number Placeholder 3"/>
+          <p:cNvSpPr>
+            <a:spLocks noGrp="1"/>
+          </p:cNvSpPr>
+          <p:nvPr>
+            <p:ph type="sldNum" sz="quarter" idx="4"/>
+          </p:nvPr>
+        </p:nvSpPr>
+        <p:spPr/>
+        <p:txBody>
+          <a:bodyPr/>
+          <a:lstStyle/>
+          <a:p>
+            <a:pPr>
+              <a:defRPr/>
+            </a:pPr>
+            <a:fld id="{92185B65-240A-465E-998D-9B43C073AEB9}" type="slidenum">
+              <a:rPr lang="en-GB" smtClean="0"/>
+              <a:pPr>
+                <a:defRPr/>
+              </a:pPr>
+              <a:t>20</a:t>
+            </a:fld>
+            <a:endParaRPr lang="en-GB" dirty="0"/>
+          </a:p>
+        </p:txBody>
+      </p:sp>
+    </p:spTree>
+    <p:extLst>
+      <p:ext uri="{BB962C8B-B14F-4D97-AF65-F5344CB8AC3E}">
+        <p14:creationId xmlns:p14="http://schemas.microsoft.com/office/powerpoint/2010/main" val="3789521454"/>
+      </p:ext>
+    </p:extLst>
+  </p:cSld>
+  <p:clrMapOvr>
+    <a:masterClrMapping/>
+  </p:clrMapOvr>
+  <p:timing>
+    <p:tnLst>
+      <p:par>
+        <p:cTn id="1" dur="indefinite" restart="never" nodeType="tmRoot"/>
+      </p:par>
+    </p:tnLst>
+  </p:timing>
 </p:sld>
 </file>
 
@@ -7625,7 +7602,6 @@
               <a:rPr lang="en-AU" dirty="0" smtClean="0"/>
               <a:t>Estimate tasks:</a:t>
             </a:r>
-            <a:endParaRPr lang="en-AU" dirty="0" smtClean="0"/>
           </a:p>
           <a:p>
             <a:pPr lvl="1"/>
@@ -7648,11 +7624,7 @@
           <a:p>
             <a:r>
               <a:rPr lang="en-AU" dirty="0" smtClean="0"/>
-              <a:t>Schedule </a:t>
-            </a:r>
-            <a:r>
-              <a:rPr lang="en-AU" dirty="0" smtClean="0"/>
-              <a:t>and assign tasks; consider:</a:t>
+              <a:t>Schedule and assign tasks; consider:</a:t>
             </a:r>
           </a:p>
           <a:p>

</xml_diff>

<commit_message>
Updated the presentation for 2018
</commit_message>
<xml_diff>
--- a/TimeManagementAndProjectPlanning.pptx
+++ b/TimeManagementAndProjectPlanning.pptx
@@ -5,10 +5,10 @@
     <p:sldMasterId id="2147483649" r:id="rId1"/>
   </p:sldMasterIdLst>
   <p:notesMasterIdLst>
-    <p:notesMasterId r:id="rId27"/>
+    <p:notesMasterId r:id="rId28"/>
   </p:notesMasterIdLst>
   <p:handoutMasterIdLst>
-    <p:handoutMasterId r:id="rId28"/>
+    <p:handoutMasterId r:id="rId29"/>
   </p:handoutMasterIdLst>
   <p:sldIdLst>
     <p:sldId id="258" r:id="rId2"/>
@@ -35,7 +35,8 @@
     <p:sldId id="268" r:id="rId23"/>
     <p:sldId id="262" r:id="rId24"/>
     <p:sldId id="284" r:id="rId25"/>
-    <p:sldId id="278" r:id="rId26"/>
+    <p:sldId id="285" r:id="rId26"/>
+    <p:sldId id="278" r:id="rId27"/>
   </p:sldIdLst>
   <p:sldSz cx="9144000" cy="6858000" type="screen4x3"/>
   <p:notesSz cx="6735763" cy="9866313"/>
@@ -4513,7 +4514,7 @@
             <a:pPr algn="l"/>
             <a:r>
               <a:rPr lang="en-AU" dirty="0"/>
-              <a:t>Time management and project planning</a:t>
+              <a:t>Time management and project planning/management</a:t>
             </a:r>
           </a:p>
         </p:txBody>
@@ -7038,7 +7039,13 @@
       </p:grpSpPr>
       <p:sp>
         <p:nvSpPr>
-          <p:cNvPr id="2" name="Title 1"/>
+          <p:cNvPr id="2" name="Title 1">
+            <a:extLst>
+              <a:ext uri="{FF2B5EF4-FFF2-40B4-BE49-F238E27FC236}">
+                <a16:creationId xmlns:a16="http://schemas.microsoft.com/office/drawing/2014/main" id="{11B1390B-97AD-4CE5-985C-253FF2F8CAB9}"/>
+              </a:ext>
+            </a:extLst>
+          </p:cNvPr>
           <p:cNvSpPr>
             <a:spLocks noGrp="1"/>
           </p:cNvSpPr>
@@ -7053,19 +7060,25 @@
           <a:p>
             <a:r>
               <a:rPr lang="en-AU" dirty="0"/>
-              <a:t>Thankyou</a:t>
-            </a:r>
-          </a:p>
-        </p:txBody>
-      </p:sp>
-      <p:sp>
-        <p:nvSpPr>
-          <p:cNvPr id="3" name="Text Placeholder 2"/>
-          <p:cNvSpPr>
-            <a:spLocks noGrp="1"/>
-          </p:cNvSpPr>
-          <p:nvPr>
-            <p:ph type="body" idx="1"/>
+              <a:t>Good project manager attributes</a:t>
+            </a:r>
+          </a:p>
+        </p:txBody>
+      </p:sp>
+      <p:sp>
+        <p:nvSpPr>
+          <p:cNvPr id="3" name="Content Placeholder 2">
+            <a:extLst>
+              <a:ext uri="{FF2B5EF4-FFF2-40B4-BE49-F238E27FC236}">
+                <a16:creationId xmlns:a16="http://schemas.microsoft.com/office/drawing/2014/main" id="{D68CAABD-56A9-47D1-BB5B-55E6BAB02978}"/>
+              </a:ext>
+            </a:extLst>
+          </p:cNvPr>
+          <p:cNvSpPr>
+            <a:spLocks noGrp="1"/>
+          </p:cNvSpPr>
+          <p:nvPr>
+            <p:ph idx="1"/>
           </p:nvPr>
         </p:nvSpPr>
         <p:spPr/>
@@ -7073,43 +7086,59 @@
           <a:bodyPr/>
           <a:lstStyle/>
           <a:p>
-            <a:pPr algn="r"/>
-            <a:r>
-              <a:rPr lang="en-AU" dirty="0"/>
-              <a:t>Rob Moore</a:t>
-            </a:r>
-          </a:p>
-          <a:p>
-            <a:pPr algn="r"/>
-            <a:r>
-              <a:rPr lang="en-AU" dirty="0"/>
-              <a:t>Principal Consultant, Readify</a:t>
-            </a:r>
-          </a:p>
-          <a:p>
-            <a:pPr algn="r"/>
-            <a:r>
-              <a:rPr lang="en-AU" dirty="0"/>
-              <a:t>rob.moore@readify.net</a:t>
-            </a:r>
-          </a:p>
-          <a:p>
-            <a:pPr algn="r"/>
-            <a:r>
-              <a:rPr lang="en-AU" dirty="0"/>
-              <a:t>@</a:t>
-            </a:r>
-            <a:r>
-              <a:rPr lang="en-AU" dirty="0" err="1"/>
-              <a:t>robdmoore</a:t>
-            </a:r>
-            <a:endParaRPr lang="en-AU" dirty="0"/>
-          </a:p>
-        </p:txBody>
-      </p:sp>
-      <p:sp>
-        <p:nvSpPr>
-          <p:cNvPr id="4" name="Slide Number Placeholder 3"/>
+            <a:r>
+              <a:rPr lang="en-AU" sz="2800" dirty="0"/>
+              <a:t>Follow intent rather than letter of the plan </a:t>
+            </a:r>
+          </a:p>
+          <a:p>
+            <a:r>
+              <a:rPr lang="en-AU" sz="2800" dirty="0"/>
+              <a:t>Servant leader</a:t>
+            </a:r>
+          </a:p>
+          <a:p>
+            <a:pPr lvl="1"/>
+            <a:r>
+              <a:rPr lang="en-AU" sz="2400" dirty="0"/>
+              <a:t>Strike a good balance between being engaged / supportive and micromanaging</a:t>
+            </a:r>
+          </a:p>
+          <a:p>
+            <a:r>
+              <a:rPr lang="en-AU" sz="2800" dirty="0"/>
+              <a:t>Set expectations early and often</a:t>
+            </a:r>
+          </a:p>
+          <a:p>
+            <a:r>
+              <a:rPr lang="en-AU" sz="2800" dirty="0"/>
+              <a:t>Minimise governance overhead</a:t>
+            </a:r>
+          </a:p>
+          <a:p>
+            <a:r>
+              <a:rPr lang="en-AU" sz="2800" dirty="0"/>
+              <a:t>Start small and inspect and adapt</a:t>
+            </a:r>
+          </a:p>
+          <a:p>
+            <a:r>
+              <a:rPr lang="en-AU" sz="2800" dirty="0"/>
+              <a:t>Create an autonomy, mastery, purpose environment</a:t>
+            </a:r>
+          </a:p>
+        </p:txBody>
+      </p:sp>
+      <p:sp>
+        <p:nvSpPr>
+          <p:cNvPr id="4" name="Slide Number Placeholder 3">
+            <a:extLst>
+              <a:ext uri="{FF2B5EF4-FFF2-40B4-BE49-F238E27FC236}">
+                <a16:creationId xmlns:a16="http://schemas.microsoft.com/office/drawing/2014/main" id="{CC4E112A-F18F-4AEE-9467-CB4923079CF8}"/>
+              </a:ext>
+            </a:extLst>
+          </p:cNvPr>
           <p:cNvSpPr>
             <a:spLocks noGrp="1"/>
           </p:cNvSpPr>
@@ -7131,6 +7160,136 @@
                 <a:defRPr/>
               </a:pPr>
               <a:t>25</a:t>
+            </a:fld>
+            <a:endParaRPr lang="en-GB" dirty="0"/>
+          </a:p>
+        </p:txBody>
+      </p:sp>
+    </p:spTree>
+    <p:extLst>
+      <p:ext uri="{BB962C8B-B14F-4D97-AF65-F5344CB8AC3E}">
+        <p14:creationId xmlns:p14="http://schemas.microsoft.com/office/powerpoint/2010/main" val="1695978594"/>
+      </p:ext>
+    </p:extLst>
+  </p:cSld>
+  <p:clrMapOvr>
+    <a:masterClrMapping/>
+  </p:clrMapOvr>
+</p:sld>
+</file>
+
+<file path=ppt/slides/slide26.xml><?xml version="1.0" encoding="utf-8"?>
+<p:sld xmlns:a="http://schemas.openxmlformats.org/drawingml/2006/main" xmlns:r="http://schemas.openxmlformats.org/officeDocument/2006/relationships" xmlns:p="http://schemas.openxmlformats.org/presentationml/2006/main">
+  <p:cSld>
+    <p:spTree>
+      <p:nvGrpSpPr>
+        <p:cNvPr id="1" name=""/>
+        <p:cNvGrpSpPr/>
+        <p:nvPr/>
+      </p:nvGrpSpPr>
+      <p:grpSpPr>
+        <a:xfrm>
+          <a:off x="0" y="0"/>
+          <a:ext cx="0" cy="0"/>
+          <a:chOff x="0" y="0"/>
+          <a:chExt cx="0" cy="0"/>
+        </a:xfrm>
+      </p:grpSpPr>
+      <p:sp>
+        <p:nvSpPr>
+          <p:cNvPr id="2" name="Title 1"/>
+          <p:cNvSpPr>
+            <a:spLocks noGrp="1"/>
+          </p:cNvSpPr>
+          <p:nvPr>
+            <p:ph type="title"/>
+          </p:nvPr>
+        </p:nvSpPr>
+        <p:spPr/>
+        <p:txBody>
+          <a:bodyPr/>
+          <a:lstStyle/>
+          <a:p>
+            <a:r>
+              <a:rPr lang="en-AU" dirty="0"/>
+              <a:t>Thankyou</a:t>
+            </a:r>
+          </a:p>
+        </p:txBody>
+      </p:sp>
+      <p:sp>
+        <p:nvSpPr>
+          <p:cNvPr id="3" name="Text Placeholder 2"/>
+          <p:cNvSpPr>
+            <a:spLocks noGrp="1"/>
+          </p:cNvSpPr>
+          <p:nvPr>
+            <p:ph type="body" idx="1"/>
+          </p:nvPr>
+        </p:nvSpPr>
+        <p:spPr/>
+        <p:txBody>
+          <a:bodyPr/>
+          <a:lstStyle/>
+          <a:p>
+            <a:pPr algn="r"/>
+            <a:r>
+              <a:rPr lang="en-AU" dirty="0"/>
+              <a:t>Rob Moore</a:t>
+            </a:r>
+          </a:p>
+          <a:p>
+            <a:pPr algn="r"/>
+            <a:r>
+              <a:rPr lang="en-AU" dirty="0"/>
+              <a:t>Principal Consultant, Readify</a:t>
+            </a:r>
+          </a:p>
+          <a:p>
+            <a:pPr algn="r"/>
+            <a:r>
+              <a:rPr lang="en-AU" dirty="0"/>
+              <a:t>rob.moore@readify.net</a:t>
+            </a:r>
+          </a:p>
+          <a:p>
+            <a:pPr algn="r"/>
+            <a:r>
+              <a:rPr lang="en-AU" dirty="0"/>
+              <a:t>@</a:t>
+            </a:r>
+            <a:r>
+              <a:rPr lang="en-AU" dirty="0" err="1"/>
+              <a:t>robdmoore</a:t>
+            </a:r>
+            <a:endParaRPr lang="en-AU" dirty="0"/>
+          </a:p>
+        </p:txBody>
+      </p:sp>
+      <p:sp>
+        <p:nvSpPr>
+          <p:cNvPr id="4" name="Slide Number Placeholder 3"/>
+          <p:cNvSpPr>
+            <a:spLocks noGrp="1"/>
+          </p:cNvSpPr>
+          <p:nvPr>
+            <p:ph type="sldNum" sz="quarter" idx="4"/>
+          </p:nvPr>
+        </p:nvSpPr>
+        <p:spPr/>
+        <p:txBody>
+          <a:bodyPr/>
+          <a:lstStyle/>
+          <a:p>
+            <a:pPr>
+              <a:defRPr/>
+            </a:pPr>
+            <a:fld id="{92185B65-240A-465E-998D-9B43C073AEB9}" type="slidenum">
+              <a:rPr lang="en-GB" smtClean="0"/>
+              <a:pPr>
+                <a:defRPr/>
+              </a:pPr>
+              <a:t>26</a:t>
             </a:fld>
             <a:endParaRPr lang="en-GB" dirty="0"/>
           </a:p>

</xml_diff>